<commit_message>
Alteração no slide Problema
</commit_message>
<xml_diff>
--- a/TurmaDK_Grupo05_relatorio.PPT.pptx
+++ b/TurmaDK_Grupo05_relatorio.PPT.pptx
@@ -16586,7 +16586,7 @@
         <p:fade/>
       </p:transition>
     </mc:Choice>
-    <mc:Fallback xmlns="" xmlns:mv="urn:schemas-microsoft-com:mac:vml" xmlns:c="http://schemas.openxmlformats.org/drawingml/2006/chart" xmlns:dgm="http://schemas.openxmlformats.org/drawingml/2006/diagram" xmlns:o="urn:schemas-microsoft-com:office:office" xmlns:v="urn:schemas-microsoft-com:vml" xmlns:pvml="urn:schemas-microsoft-com:office:powerpoint" xmlns:com="http://schemas.openxmlformats.org/drawingml/2006/compatibility" xmlns:p15="http://schemas.microsoft.com/office/powerpoint/2012/main">
+    <mc:Fallback xmlns:p15="http://schemas.microsoft.com/office/powerpoint/2012/main" xmlns:com="http://schemas.openxmlformats.org/drawingml/2006/compatibility" xmlns:pvml="urn:schemas-microsoft-com:office:powerpoint" xmlns:v="urn:schemas-microsoft-com:vml" xmlns:o="urn:schemas-microsoft-com:office:office" xmlns:dgm="http://schemas.openxmlformats.org/drawingml/2006/diagram" xmlns:c="http://schemas.openxmlformats.org/drawingml/2006/chart" xmlns:mv="urn:schemas-microsoft-com:mac:vml" xmlns="">
       <p:transition spd="slow">
         <p:fade/>
       </p:transition>
@@ -18576,7 +18576,7 @@
         </p:nvSpPr>
         <p:spPr>
           <a:xfrm>
-            <a:off x="601144" y="776062"/>
+            <a:off x="-3970411" y="-914946"/>
             <a:ext cx="6886800" cy="1782300"/>
           </a:xfrm>
           <a:prstGeom prst="rect">
@@ -18620,7 +18620,7 @@
         </p:nvCxnSpPr>
         <p:spPr>
           <a:xfrm>
-            <a:off x="7057375" y="2585138"/>
+            <a:off x="-57722" y="785804"/>
             <a:ext cx="2086500" cy="0"/>
           </a:xfrm>
           <a:prstGeom prst="straightConnector1">
@@ -18638,6 +18638,1041 @@
           </a:ln>
         </p:spPr>
       </p:cxnSp>
+      <p:cxnSp>
+        <p:nvCxnSpPr>
+          <p:cNvPr id="5" name="Google Shape;233;p31">
+            <a:extLst>
+              <a:ext uri="{FF2B5EF4-FFF2-40B4-BE49-F238E27FC236}">
+                <a16:creationId xmlns:a16="http://schemas.microsoft.com/office/drawing/2014/main" id="{63BC9B71-0C9F-4768-99A8-069350AD23F1}"/>
+              </a:ext>
+            </a:extLst>
+          </p:cNvPr>
+          <p:cNvCxnSpPr/>
+          <p:nvPr/>
+        </p:nvCxnSpPr>
+        <p:spPr>
+          <a:xfrm>
+            <a:off x="1840249" y="1778631"/>
+            <a:ext cx="0" cy="1467600"/>
+          </a:xfrm>
+          <a:prstGeom prst="straightConnector1">
+            <a:avLst/>
+          </a:prstGeom>
+          <a:noFill/>
+          <a:ln w="9525" cap="flat" cmpd="sng">
+            <a:solidFill>
+              <a:schemeClr val="dk2"/>
+            </a:solidFill>
+            <a:prstDash val="solid"/>
+            <a:round/>
+            <a:headEnd type="none" w="med" len="med"/>
+            <a:tailEnd type="none" w="med" len="med"/>
+          </a:ln>
+        </p:spPr>
+      </p:cxnSp>
+      <p:cxnSp>
+        <p:nvCxnSpPr>
+          <p:cNvPr id="6" name="Google Shape;233;p31">
+            <a:extLst>
+              <a:ext uri="{FF2B5EF4-FFF2-40B4-BE49-F238E27FC236}">
+                <a16:creationId xmlns:a16="http://schemas.microsoft.com/office/drawing/2014/main" id="{CE52DA1C-D121-4D16-9BB0-5EA18F0E4F04}"/>
+              </a:ext>
+            </a:extLst>
+          </p:cNvPr>
+          <p:cNvCxnSpPr/>
+          <p:nvPr/>
+        </p:nvCxnSpPr>
+        <p:spPr>
+          <a:xfrm>
+            <a:off x="3669050" y="2110152"/>
+            <a:ext cx="0" cy="1467600"/>
+          </a:xfrm>
+          <a:prstGeom prst="straightConnector1">
+            <a:avLst/>
+          </a:prstGeom>
+          <a:noFill/>
+          <a:ln w="9525" cap="flat" cmpd="sng">
+            <a:solidFill>
+              <a:schemeClr val="dk2"/>
+            </a:solidFill>
+            <a:prstDash val="solid"/>
+            <a:round/>
+            <a:headEnd type="none" w="med" len="med"/>
+            <a:tailEnd type="none" w="med" len="med"/>
+          </a:ln>
+        </p:spPr>
+      </p:cxnSp>
+      <p:sp>
+        <p:nvSpPr>
+          <p:cNvPr id="7" name="Google Shape;230;p31">
+            <a:extLst>
+              <a:ext uri="{FF2B5EF4-FFF2-40B4-BE49-F238E27FC236}">
+                <a16:creationId xmlns:a16="http://schemas.microsoft.com/office/drawing/2014/main" id="{1B2AAF1D-61D8-4C73-A8DF-9B21CF1C0D9D}"/>
+              </a:ext>
+            </a:extLst>
+          </p:cNvPr>
+          <p:cNvSpPr txBox="1">
+            <a:spLocks noGrp="1"/>
+          </p:cNvSpPr>
+          <p:nvPr>
+            <p:ph type="ctrTitle" idx="2"/>
+          </p:nvPr>
+        </p:nvSpPr>
+        <p:spPr>
+          <a:xfrm>
+            <a:off x="-227828" y="1877934"/>
+            <a:ext cx="2186100" cy="893700"/>
+          </a:xfrm>
+          <a:prstGeom prst="rect">
+            <a:avLst/>
+          </a:prstGeom>
+        </p:spPr>
+        <p:txBody>
+          <a:bodyPr spcFirstLastPara="1" wrap="square" lIns="91425" tIns="91425" rIns="91425" bIns="91425" anchor="b" anchorCtr="0">
+            <a:noAutofit/>
+          </a:bodyPr>
+          <a:lstStyle/>
+          <a:p>
+            <a:pPr marL="0" lvl="0" indent="0" algn="ctr" rtl="0">
+              <a:spcBef>
+                <a:spcPts val="0"/>
+              </a:spcBef>
+              <a:spcAft>
+                <a:spcPts val="0"/>
+              </a:spcAft>
+              <a:buNone/>
+            </a:pPr>
+            <a:r>
+              <a:rPr lang="en" dirty="0"/>
+              <a:t>Estudar e analisar Séries Temporais</a:t>
+            </a:r>
+            <a:endParaRPr dirty="0"/>
+          </a:p>
+        </p:txBody>
+      </p:sp>
+      <p:sp>
+        <p:nvSpPr>
+          <p:cNvPr id="8" name="Google Shape;230;p31">
+            <a:extLst>
+              <a:ext uri="{FF2B5EF4-FFF2-40B4-BE49-F238E27FC236}">
+                <a16:creationId xmlns:a16="http://schemas.microsoft.com/office/drawing/2014/main" id="{28E4BF0A-0CC7-41B6-8907-CD38EB9BC409}"/>
+              </a:ext>
+            </a:extLst>
+          </p:cNvPr>
+          <p:cNvSpPr txBox="1">
+            <a:spLocks/>
+          </p:cNvSpPr>
+          <p:nvPr/>
+        </p:nvSpPr>
+        <p:spPr>
+          <a:xfrm>
+            <a:off x="1689458" y="2305954"/>
+            <a:ext cx="2186100" cy="893700"/>
+          </a:xfrm>
+          <a:prstGeom prst="rect">
+            <a:avLst/>
+          </a:prstGeom>
+          <a:noFill/>
+          <a:ln>
+            <a:noFill/>
+          </a:ln>
+        </p:spPr>
+        <p:txBody>
+          <a:bodyPr spcFirstLastPara="1" wrap="square" lIns="91425" tIns="91425" rIns="91425" bIns="91425" anchor="b" anchorCtr="0">
+            <a:noAutofit/>
+          </a:bodyPr>
+          <a:lstStyle>
+            <a:defPPr marR="0" lvl="0" algn="l" rtl="0">
+              <a:lnSpc>
+                <a:spcPct val="100000"/>
+              </a:lnSpc>
+              <a:spcBef>
+                <a:spcPts val="0"/>
+              </a:spcBef>
+              <a:spcAft>
+                <a:spcPts val="0"/>
+              </a:spcAft>
+            </a:defPPr>
+            <a:lvl1pPr marR="0" lvl="0" algn="r" rtl="0">
+              <a:lnSpc>
+                <a:spcPct val="100000"/>
+              </a:lnSpc>
+              <a:spcBef>
+                <a:spcPts val="0"/>
+              </a:spcBef>
+              <a:spcAft>
+                <a:spcPts val="0"/>
+              </a:spcAft>
+              <a:buClr>
+                <a:schemeClr val="dk1"/>
+              </a:buClr>
+              <a:buSzPts val="1400"/>
+              <a:buFont typeface="Exo 2"/>
+              <a:buNone/>
+              <a:defRPr sz="1400" b="1" i="0" u="none" strike="noStrike" cap="none">
+                <a:solidFill>
+                  <a:schemeClr val="dk1"/>
+                </a:solidFill>
+                <a:latin typeface="Exo 2"/>
+                <a:ea typeface="Exo 2"/>
+                <a:cs typeface="Exo 2"/>
+                <a:sym typeface="Exo 2"/>
+              </a:defRPr>
+            </a:lvl1pPr>
+            <a:lvl2pPr marR="0" lvl="1" algn="r" rtl="0">
+              <a:lnSpc>
+                <a:spcPct val="100000"/>
+              </a:lnSpc>
+              <a:spcBef>
+                <a:spcPts val="0"/>
+              </a:spcBef>
+              <a:spcAft>
+                <a:spcPts val="0"/>
+              </a:spcAft>
+              <a:buClr>
+                <a:schemeClr val="dk1"/>
+              </a:buClr>
+              <a:buSzPts val="1400"/>
+              <a:buFont typeface="Squada One"/>
+              <a:buNone/>
+              <a:defRPr sz="1400" b="0" i="0" u="none" strike="noStrike" cap="none">
+                <a:solidFill>
+                  <a:schemeClr val="dk1"/>
+                </a:solidFill>
+                <a:latin typeface="Squada One"/>
+                <a:ea typeface="Squada One"/>
+                <a:cs typeface="Squada One"/>
+                <a:sym typeface="Squada One"/>
+              </a:defRPr>
+            </a:lvl2pPr>
+            <a:lvl3pPr marR="0" lvl="2" algn="r" rtl="0">
+              <a:lnSpc>
+                <a:spcPct val="100000"/>
+              </a:lnSpc>
+              <a:spcBef>
+                <a:spcPts val="0"/>
+              </a:spcBef>
+              <a:spcAft>
+                <a:spcPts val="0"/>
+              </a:spcAft>
+              <a:buClr>
+                <a:schemeClr val="dk1"/>
+              </a:buClr>
+              <a:buSzPts val="1400"/>
+              <a:buFont typeface="Squada One"/>
+              <a:buNone/>
+              <a:defRPr sz="1400" b="0" i="0" u="none" strike="noStrike" cap="none">
+                <a:solidFill>
+                  <a:schemeClr val="dk1"/>
+                </a:solidFill>
+                <a:latin typeface="Squada One"/>
+                <a:ea typeface="Squada One"/>
+                <a:cs typeface="Squada One"/>
+                <a:sym typeface="Squada One"/>
+              </a:defRPr>
+            </a:lvl3pPr>
+            <a:lvl4pPr marR="0" lvl="3" algn="r" rtl="0">
+              <a:lnSpc>
+                <a:spcPct val="100000"/>
+              </a:lnSpc>
+              <a:spcBef>
+                <a:spcPts val="0"/>
+              </a:spcBef>
+              <a:spcAft>
+                <a:spcPts val="0"/>
+              </a:spcAft>
+              <a:buClr>
+                <a:schemeClr val="dk1"/>
+              </a:buClr>
+              <a:buSzPts val="1400"/>
+              <a:buFont typeface="Squada One"/>
+              <a:buNone/>
+              <a:defRPr sz="1400" b="0" i="0" u="none" strike="noStrike" cap="none">
+                <a:solidFill>
+                  <a:schemeClr val="dk1"/>
+                </a:solidFill>
+                <a:latin typeface="Squada One"/>
+                <a:ea typeface="Squada One"/>
+                <a:cs typeface="Squada One"/>
+                <a:sym typeface="Squada One"/>
+              </a:defRPr>
+            </a:lvl4pPr>
+            <a:lvl5pPr marR="0" lvl="4" algn="r" rtl="0">
+              <a:lnSpc>
+                <a:spcPct val="100000"/>
+              </a:lnSpc>
+              <a:spcBef>
+                <a:spcPts val="0"/>
+              </a:spcBef>
+              <a:spcAft>
+                <a:spcPts val="0"/>
+              </a:spcAft>
+              <a:buClr>
+                <a:schemeClr val="dk1"/>
+              </a:buClr>
+              <a:buSzPts val="1400"/>
+              <a:buFont typeface="Squada One"/>
+              <a:buNone/>
+              <a:defRPr sz="1400" b="0" i="0" u="none" strike="noStrike" cap="none">
+                <a:solidFill>
+                  <a:schemeClr val="dk1"/>
+                </a:solidFill>
+                <a:latin typeface="Squada One"/>
+                <a:ea typeface="Squada One"/>
+                <a:cs typeface="Squada One"/>
+                <a:sym typeface="Squada One"/>
+              </a:defRPr>
+            </a:lvl5pPr>
+            <a:lvl6pPr marR="0" lvl="5" algn="r" rtl="0">
+              <a:lnSpc>
+                <a:spcPct val="100000"/>
+              </a:lnSpc>
+              <a:spcBef>
+                <a:spcPts val="0"/>
+              </a:spcBef>
+              <a:spcAft>
+                <a:spcPts val="0"/>
+              </a:spcAft>
+              <a:buClr>
+                <a:schemeClr val="dk1"/>
+              </a:buClr>
+              <a:buSzPts val="1400"/>
+              <a:buFont typeface="Squada One"/>
+              <a:buNone/>
+              <a:defRPr sz="1400" b="0" i="0" u="none" strike="noStrike" cap="none">
+                <a:solidFill>
+                  <a:schemeClr val="dk1"/>
+                </a:solidFill>
+                <a:latin typeface="Squada One"/>
+                <a:ea typeface="Squada One"/>
+                <a:cs typeface="Squada One"/>
+                <a:sym typeface="Squada One"/>
+              </a:defRPr>
+            </a:lvl6pPr>
+            <a:lvl7pPr marR="0" lvl="6" algn="r" rtl="0">
+              <a:lnSpc>
+                <a:spcPct val="100000"/>
+              </a:lnSpc>
+              <a:spcBef>
+                <a:spcPts val="0"/>
+              </a:spcBef>
+              <a:spcAft>
+                <a:spcPts val="0"/>
+              </a:spcAft>
+              <a:buClr>
+                <a:schemeClr val="dk1"/>
+              </a:buClr>
+              <a:buSzPts val="1400"/>
+              <a:buFont typeface="Squada One"/>
+              <a:buNone/>
+              <a:defRPr sz="1400" b="0" i="0" u="none" strike="noStrike" cap="none">
+                <a:solidFill>
+                  <a:schemeClr val="dk1"/>
+                </a:solidFill>
+                <a:latin typeface="Squada One"/>
+                <a:ea typeface="Squada One"/>
+                <a:cs typeface="Squada One"/>
+                <a:sym typeface="Squada One"/>
+              </a:defRPr>
+            </a:lvl7pPr>
+            <a:lvl8pPr marR="0" lvl="7" algn="r" rtl="0">
+              <a:lnSpc>
+                <a:spcPct val="100000"/>
+              </a:lnSpc>
+              <a:spcBef>
+                <a:spcPts val="0"/>
+              </a:spcBef>
+              <a:spcAft>
+                <a:spcPts val="0"/>
+              </a:spcAft>
+              <a:buClr>
+                <a:schemeClr val="dk1"/>
+              </a:buClr>
+              <a:buSzPts val="1400"/>
+              <a:buFont typeface="Squada One"/>
+              <a:buNone/>
+              <a:defRPr sz="1400" b="0" i="0" u="none" strike="noStrike" cap="none">
+                <a:solidFill>
+                  <a:schemeClr val="dk1"/>
+                </a:solidFill>
+                <a:latin typeface="Squada One"/>
+                <a:ea typeface="Squada One"/>
+                <a:cs typeface="Squada One"/>
+                <a:sym typeface="Squada One"/>
+              </a:defRPr>
+            </a:lvl8pPr>
+            <a:lvl9pPr marR="0" lvl="8" algn="r" rtl="0">
+              <a:lnSpc>
+                <a:spcPct val="100000"/>
+              </a:lnSpc>
+              <a:spcBef>
+                <a:spcPts val="0"/>
+              </a:spcBef>
+              <a:spcAft>
+                <a:spcPts val="0"/>
+              </a:spcAft>
+              <a:buClr>
+                <a:schemeClr val="dk1"/>
+              </a:buClr>
+              <a:buSzPts val="1400"/>
+              <a:buFont typeface="Squada One"/>
+              <a:buNone/>
+              <a:defRPr sz="1400" b="0" i="0" u="none" strike="noStrike" cap="none">
+                <a:solidFill>
+                  <a:schemeClr val="dk1"/>
+                </a:solidFill>
+                <a:latin typeface="Squada One"/>
+                <a:ea typeface="Squada One"/>
+                <a:cs typeface="Squada One"/>
+                <a:sym typeface="Squada One"/>
+              </a:defRPr>
+            </a:lvl9pPr>
+          </a:lstStyle>
+          <a:p>
+            <a:pPr algn="ctr"/>
+            <a:r>
+              <a:rPr lang="pt-PT" dirty="0"/>
+              <a:t>Efetuar filtragens e previsões</a:t>
+            </a:r>
+          </a:p>
+        </p:txBody>
+      </p:sp>
+      <p:sp>
+        <p:nvSpPr>
+          <p:cNvPr id="9" name="Google Shape;230;p31">
+            <a:extLst>
+              <a:ext uri="{FF2B5EF4-FFF2-40B4-BE49-F238E27FC236}">
+                <a16:creationId xmlns:a16="http://schemas.microsoft.com/office/drawing/2014/main" id="{83128B35-C721-42DE-B6A7-3BD89D22DB3C}"/>
+              </a:ext>
+            </a:extLst>
+          </p:cNvPr>
+          <p:cNvSpPr txBox="1">
+            <a:spLocks/>
+          </p:cNvSpPr>
+          <p:nvPr/>
+        </p:nvSpPr>
+        <p:spPr>
+          <a:xfrm>
+            <a:off x="3636252" y="2889733"/>
+            <a:ext cx="2186100" cy="893700"/>
+          </a:xfrm>
+          <a:prstGeom prst="rect">
+            <a:avLst/>
+          </a:prstGeom>
+          <a:noFill/>
+          <a:ln>
+            <a:noFill/>
+          </a:ln>
+        </p:spPr>
+        <p:txBody>
+          <a:bodyPr spcFirstLastPara="1" wrap="square" lIns="91425" tIns="91425" rIns="91425" bIns="91425" anchor="b" anchorCtr="0">
+            <a:noAutofit/>
+          </a:bodyPr>
+          <a:lstStyle>
+            <a:defPPr marR="0" lvl="0" algn="l" rtl="0">
+              <a:lnSpc>
+                <a:spcPct val="100000"/>
+              </a:lnSpc>
+              <a:spcBef>
+                <a:spcPts val="0"/>
+              </a:spcBef>
+              <a:spcAft>
+                <a:spcPts val="0"/>
+              </a:spcAft>
+            </a:defPPr>
+            <a:lvl1pPr marR="0" lvl="0" algn="r" rtl="0">
+              <a:lnSpc>
+                <a:spcPct val="100000"/>
+              </a:lnSpc>
+              <a:spcBef>
+                <a:spcPts val="0"/>
+              </a:spcBef>
+              <a:spcAft>
+                <a:spcPts val="0"/>
+              </a:spcAft>
+              <a:buClr>
+                <a:schemeClr val="dk1"/>
+              </a:buClr>
+              <a:buSzPts val="1400"/>
+              <a:buFont typeface="Exo 2"/>
+              <a:buNone/>
+              <a:defRPr sz="1400" b="1" i="0" u="none" strike="noStrike" cap="none">
+                <a:solidFill>
+                  <a:schemeClr val="dk1"/>
+                </a:solidFill>
+                <a:latin typeface="Exo 2"/>
+                <a:ea typeface="Exo 2"/>
+                <a:cs typeface="Exo 2"/>
+                <a:sym typeface="Exo 2"/>
+              </a:defRPr>
+            </a:lvl1pPr>
+            <a:lvl2pPr marR="0" lvl="1" algn="r" rtl="0">
+              <a:lnSpc>
+                <a:spcPct val="100000"/>
+              </a:lnSpc>
+              <a:spcBef>
+                <a:spcPts val="0"/>
+              </a:spcBef>
+              <a:spcAft>
+                <a:spcPts val="0"/>
+              </a:spcAft>
+              <a:buClr>
+                <a:schemeClr val="dk1"/>
+              </a:buClr>
+              <a:buSzPts val="1400"/>
+              <a:buFont typeface="Squada One"/>
+              <a:buNone/>
+              <a:defRPr sz="1400" b="0" i="0" u="none" strike="noStrike" cap="none">
+                <a:solidFill>
+                  <a:schemeClr val="dk1"/>
+                </a:solidFill>
+                <a:latin typeface="Squada One"/>
+                <a:ea typeface="Squada One"/>
+                <a:cs typeface="Squada One"/>
+                <a:sym typeface="Squada One"/>
+              </a:defRPr>
+            </a:lvl2pPr>
+            <a:lvl3pPr marR="0" lvl="2" algn="r" rtl="0">
+              <a:lnSpc>
+                <a:spcPct val="100000"/>
+              </a:lnSpc>
+              <a:spcBef>
+                <a:spcPts val="0"/>
+              </a:spcBef>
+              <a:spcAft>
+                <a:spcPts val="0"/>
+              </a:spcAft>
+              <a:buClr>
+                <a:schemeClr val="dk1"/>
+              </a:buClr>
+              <a:buSzPts val="1400"/>
+              <a:buFont typeface="Squada One"/>
+              <a:buNone/>
+              <a:defRPr sz="1400" b="0" i="0" u="none" strike="noStrike" cap="none">
+                <a:solidFill>
+                  <a:schemeClr val="dk1"/>
+                </a:solidFill>
+                <a:latin typeface="Squada One"/>
+                <a:ea typeface="Squada One"/>
+                <a:cs typeface="Squada One"/>
+                <a:sym typeface="Squada One"/>
+              </a:defRPr>
+            </a:lvl3pPr>
+            <a:lvl4pPr marR="0" lvl="3" algn="r" rtl="0">
+              <a:lnSpc>
+                <a:spcPct val="100000"/>
+              </a:lnSpc>
+              <a:spcBef>
+                <a:spcPts val="0"/>
+              </a:spcBef>
+              <a:spcAft>
+                <a:spcPts val="0"/>
+              </a:spcAft>
+              <a:buClr>
+                <a:schemeClr val="dk1"/>
+              </a:buClr>
+              <a:buSzPts val="1400"/>
+              <a:buFont typeface="Squada One"/>
+              <a:buNone/>
+              <a:defRPr sz="1400" b="0" i="0" u="none" strike="noStrike" cap="none">
+                <a:solidFill>
+                  <a:schemeClr val="dk1"/>
+                </a:solidFill>
+                <a:latin typeface="Squada One"/>
+                <a:ea typeface="Squada One"/>
+                <a:cs typeface="Squada One"/>
+                <a:sym typeface="Squada One"/>
+              </a:defRPr>
+            </a:lvl4pPr>
+            <a:lvl5pPr marR="0" lvl="4" algn="r" rtl="0">
+              <a:lnSpc>
+                <a:spcPct val="100000"/>
+              </a:lnSpc>
+              <a:spcBef>
+                <a:spcPts val="0"/>
+              </a:spcBef>
+              <a:spcAft>
+                <a:spcPts val="0"/>
+              </a:spcAft>
+              <a:buClr>
+                <a:schemeClr val="dk1"/>
+              </a:buClr>
+              <a:buSzPts val="1400"/>
+              <a:buFont typeface="Squada One"/>
+              <a:buNone/>
+              <a:defRPr sz="1400" b="0" i="0" u="none" strike="noStrike" cap="none">
+                <a:solidFill>
+                  <a:schemeClr val="dk1"/>
+                </a:solidFill>
+                <a:latin typeface="Squada One"/>
+                <a:ea typeface="Squada One"/>
+                <a:cs typeface="Squada One"/>
+                <a:sym typeface="Squada One"/>
+              </a:defRPr>
+            </a:lvl5pPr>
+            <a:lvl6pPr marR="0" lvl="5" algn="r" rtl="0">
+              <a:lnSpc>
+                <a:spcPct val="100000"/>
+              </a:lnSpc>
+              <a:spcBef>
+                <a:spcPts val="0"/>
+              </a:spcBef>
+              <a:spcAft>
+                <a:spcPts val="0"/>
+              </a:spcAft>
+              <a:buClr>
+                <a:schemeClr val="dk1"/>
+              </a:buClr>
+              <a:buSzPts val="1400"/>
+              <a:buFont typeface="Squada One"/>
+              <a:buNone/>
+              <a:defRPr sz="1400" b="0" i="0" u="none" strike="noStrike" cap="none">
+                <a:solidFill>
+                  <a:schemeClr val="dk1"/>
+                </a:solidFill>
+                <a:latin typeface="Squada One"/>
+                <a:ea typeface="Squada One"/>
+                <a:cs typeface="Squada One"/>
+                <a:sym typeface="Squada One"/>
+              </a:defRPr>
+            </a:lvl6pPr>
+            <a:lvl7pPr marR="0" lvl="6" algn="r" rtl="0">
+              <a:lnSpc>
+                <a:spcPct val="100000"/>
+              </a:lnSpc>
+              <a:spcBef>
+                <a:spcPts val="0"/>
+              </a:spcBef>
+              <a:spcAft>
+                <a:spcPts val="0"/>
+              </a:spcAft>
+              <a:buClr>
+                <a:schemeClr val="dk1"/>
+              </a:buClr>
+              <a:buSzPts val="1400"/>
+              <a:buFont typeface="Squada One"/>
+              <a:buNone/>
+              <a:defRPr sz="1400" b="0" i="0" u="none" strike="noStrike" cap="none">
+                <a:solidFill>
+                  <a:schemeClr val="dk1"/>
+                </a:solidFill>
+                <a:latin typeface="Squada One"/>
+                <a:ea typeface="Squada One"/>
+                <a:cs typeface="Squada One"/>
+                <a:sym typeface="Squada One"/>
+              </a:defRPr>
+            </a:lvl7pPr>
+            <a:lvl8pPr marR="0" lvl="7" algn="r" rtl="0">
+              <a:lnSpc>
+                <a:spcPct val="100000"/>
+              </a:lnSpc>
+              <a:spcBef>
+                <a:spcPts val="0"/>
+              </a:spcBef>
+              <a:spcAft>
+                <a:spcPts val="0"/>
+              </a:spcAft>
+              <a:buClr>
+                <a:schemeClr val="dk1"/>
+              </a:buClr>
+              <a:buSzPts val="1400"/>
+              <a:buFont typeface="Squada One"/>
+              <a:buNone/>
+              <a:defRPr sz="1400" b="0" i="0" u="none" strike="noStrike" cap="none">
+                <a:solidFill>
+                  <a:schemeClr val="dk1"/>
+                </a:solidFill>
+                <a:latin typeface="Squada One"/>
+                <a:ea typeface="Squada One"/>
+                <a:cs typeface="Squada One"/>
+                <a:sym typeface="Squada One"/>
+              </a:defRPr>
+            </a:lvl8pPr>
+            <a:lvl9pPr marR="0" lvl="8" algn="r" rtl="0">
+              <a:lnSpc>
+                <a:spcPct val="100000"/>
+              </a:lnSpc>
+              <a:spcBef>
+                <a:spcPts val="0"/>
+              </a:spcBef>
+              <a:spcAft>
+                <a:spcPts val="0"/>
+              </a:spcAft>
+              <a:buClr>
+                <a:schemeClr val="dk1"/>
+              </a:buClr>
+              <a:buSzPts val="1400"/>
+              <a:buFont typeface="Squada One"/>
+              <a:buNone/>
+              <a:defRPr sz="1400" b="0" i="0" u="none" strike="noStrike" cap="none">
+                <a:solidFill>
+                  <a:schemeClr val="dk1"/>
+                </a:solidFill>
+                <a:latin typeface="Squada One"/>
+                <a:ea typeface="Squada One"/>
+                <a:cs typeface="Squada One"/>
+                <a:sym typeface="Squada One"/>
+              </a:defRPr>
+            </a:lvl9pPr>
+          </a:lstStyle>
+          <a:p>
+            <a:pPr algn="ctr"/>
+            <a:r>
+              <a:rPr lang="pt-PT" dirty="0"/>
+              <a:t>Elaborar gráficos a partir dos dados tratados</a:t>
+            </a:r>
+          </a:p>
+        </p:txBody>
+      </p:sp>
+      <p:sp>
+        <p:nvSpPr>
+          <p:cNvPr id="2" name="Seta: Divisa 1">
+            <a:extLst>
+              <a:ext uri="{FF2B5EF4-FFF2-40B4-BE49-F238E27FC236}">
+                <a16:creationId xmlns:a16="http://schemas.microsoft.com/office/drawing/2014/main" id="{15297E23-75B7-4C3A-A70E-496A92F41830}"/>
+              </a:ext>
+            </a:extLst>
+          </p:cNvPr>
+          <p:cNvSpPr/>
+          <p:nvPr/>
+        </p:nvSpPr>
+        <p:spPr>
+          <a:xfrm>
+            <a:off x="6009968" y="2305954"/>
+            <a:ext cx="797785" cy="940277"/>
+          </a:xfrm>
+          <a:prstGeom prst="chevron">
+            <a:avLst/>
+          </a:prstGeom>
+          <a:solidFill>
+            <a:schemeClr val="tx2">
+              <a:lumMod val="50000"/>
+            </a:schemeClr>
+          </a:solidFill>
+          <a:ln>
+            <a:solidFill>
+              <a:schemeClr val="tx2">
+                <a:lumMod val="50000"/>
+              </a:schemeClr>
+            </a:solidFill>
+          </a:ln>
+        </p:spPr>
+        <p:style>
+          <a:lnRef idx="2">
+            <a:schemeClr val="accent1">
+              <a:shade val="50000"/>
+            </a:schemeClr>
+          </a:lnRef>
+          <a:fillRef idx="1">
+            <a:schemeClr val="accent1"/>
+          </a:fillRef>
+          <a:effectRef idx="0">
+            <a:schemeClr val="accent1"/>
+          </a:effectRef>
+          <a:fontRef idx="minor">
+            <a:schemeClr val="lt1"/>
+          </a:fontRef>
+        </p:style>
+        <p:txBody>
+          <a:bodyPr rtlCol="0" anchor="ctr"/>
+          <a:lstStyle/>
+          <a:p>
+            <a:pPr algn="ctr"/>
+            <a:endParaRPr lang="pt-PT">
+              <a:solidFill>
+                <a:schemeClr val="tx1"/>
+              </a:solidFill>
+            </a:endParaRPr>
+          </a:p>
+        </p:txBody>
+      </p:sp>
+      <p:sp>
+        <p:nvSpPr>
+          <p:cNvPr id="11" name="Google Shape;230;p31">
+            <a:extLst>
+              <a:ext uri="{FF2B5EF4-FFF2-40B4-BE49-F238E27FC236}">
+                <a16:creationId xmlns:a16="http://schemas.microsoft.com/office/drawing/2014/main" id="{CC02BA0A-89A6-4786-9FD7-199483673B44}"/>
+              </a:ext>
+            </a:extLst>
+          </p:cNvPr>
+          <p:cNvSpPr txBox="1">
+            <a:spLocks/>
+          </p:cNvSpPr>
+          <p:nvPr/>
+        </p:nvSpPr>
+        <p:spPr>
+          <a:xfrm>
+            <a:off x="6733414" y="2336668"/>
+            <a:ext cx="2186100" cy="893700"/>
+          </a:xfrm>
+          <a:prstGeom prst="rect">
+            <a:avLst/>
+          </a:prstGeom>
+          <a:noFill/>
+          <a:ln>
+            <a:noFill/>
+          </a:ln>
+        </p:spPr>
+        <p:txBody>
+          <a:bodyPr spcFirstLastPara="1" wrap="square" lIns="91425" tIns="91425" rIns="91425" bIns="91425" anchor="b" anchorCtr="0">
+            <a:noAutofit/>
+          </a:bodyPr>
+          <a:lstStyle>
+            <a:defPPr marR="0" lvl="0" algn="l" rtl="0">
+              <a:lnSpc>
+                <a:spcPct val="100000"/>
+              </a:lnSpc>
+              <a:spcBef>
+                <a:spcPts val="0"/>
+              </a:spcBef>
+              <a:spcAft>
+                <a:spcPts val="0"/>
+              </a:spcAft>
+            </a:defPPr>
+            <a:lvl1pPr marR="0" lvl="0" algn="r" rtl="0">
+              <a:lnSpc>
+                <a:spcPct val="100000"/>
+              </a:lnSpc>
+              <a:spcBef>
+                <a:spcPts val="0"/>
+              </a:spcBef>
+              <a:spcAft>
+                <a:spcPts val="0"/>
+              </a:spcAft>
+              <a:buClr>
+                <a:schemeClr val="dk1"/>
+              </a:buClr>
+              <a:buSzPts val="1400"/>
+              <a:buFont typeface="Exo 2"/>
+              <a:buNone/>
+              <a:defRPr sz="1400" b="1" i="0" u="none" strike="noStrike" cap="none">
+                <a:solidFill>
+                  <a:schemeClr val="dk1"/>
+                </a:solidFill>
+                <a:latin typeface="Exo 2"/>
+                <a:ea typeface="Exo 2"/>
+                <a:cs typeface="Exo 2"/>
+                <a:sym typeface="Exo 2"/>
+              </a:defRPr>
+            </a:lvl1pPr>
+            <a:lvl2pPr marR="0" lvl="1" algn="r" rtl="0">
+              <a:lnSpc>
+                <a:spcPct val="100000"/>
+              </a:lnSpc>
+              <a:spcBef>
+                <a:spcPts val="0"/>
+              </a:spcBef>
+              <a:spcAft>
+                <a:spcPts val="0"/>
+              </a:spcAft>
+              <a:buClr>
+                <a:schemeClr val="dk1"/>
+              </a:buClr>
+              <a:buSzPts val="1400"/>
+              <a:buFont typeface="Squada One"/>
+              <a:buNone/>
+              <a:defRPr sz="1400" b="0" i="0" u="none" strike="noStrike" cap="none">
+                <a:solidFill>
+                  <a:schemeClr val="dk1"/>
+                </a:solidFill>
+                <a:latin typeface="Squada One"/>
+                <a:ea typeface="Squada One"/>
+                <a:cs typeface="Squada One"/>
+                <a:sym typeface="Squada One"/>
+              </a:defRPr>
+            </a:lvl2pPr>
+            <a:lvl3pPr marR="0" lvl="2" algn="r" rtl="0">
+              <a:lnSpc>
+                <a:spcPct val="100000"/>
+              </a:lnSpc>
+              <a:spcBef>
+                <a:spcPts val="0"/>
+              </a:spcBef>
+              <a:spcAft>
+                <a:spcPts val="0"/>
+              </a:spcAft>
+              <a:buClr>
+                <a:schemeClr val="dk1"/>
+              </a:buClr>
+              <a:buSzPts val="1400"/>
+              <a:buFont typeface="Squada One"/>
+              <a:buNone/>
+              <a:defRPr sz="1400" b="0" i="0" u="none" strike="noStrike" cap="none">
+                <a:solidFill>
+                  <a:schemeClr val="dk1"/>
+                </a:solidFill>
+                <a:latin typeface="Squada One"/>
+                <a:ea typeface="Squada One"/>
+                <a:cs typeface="Squada One"/>
+                <a:sym typeface="Squada One"/>
+              </a:defRPr>
+            </a:lvl3pPr>
+            <a:lvl4pPr marR="0" lvl="3" algn="r" rtl="0">
+              <a:lnSpc>
+                <a:spcPct val="100000"/>
+              </a:lnSpc>
+              <a:spcBef>
+                <a:spcPts val="0"/>
+              </a:spcBef>
+              <a:spcAft>
+                <a:spcPts val="0"/>
+              </a:spcAft>
+              <a:buClr>
+                <a:schemeClr val="dk1"/>
+              </a:buClr>
+              <a:buSzPts val="1400"/>
+              <a:buFont typeface="Squada One"/>
+              <a:buNone/>
+              <a:defRPr sz="1400" b="0" i="0" u="none" strike="noStrike" cap="none">
+                <a:solidFill>
+                  <a:schemeClr val="dk1"/>
+                </a:solidFill>
+                <a:latin typeface="Squada One"/>
+                <a:ea typeface="Squada One"/>
+                <a:cs typeface="Squada One"/>
+                <a:sym typeface="Squada One"/>
+              </a:defRPr>
+            </a:lvl4pPr>
+            <a:lvl5pPr marR="0" lvl="4" algn="r" rtl="0">
+              <a:lnSpc>
+                <a:spcPct val="100000"/>
+              </a:lnSpc>
+              <a:spcBef>
+                <a:spcPts val="0"/>
+              </a:spcBef>
+              <a:spcAft>
+                <a:spcPts val="0"/>
+              </a:spcAft>
+              <a:buClr>
+                <a:schemeClr val="dk1"/>
+              </a:buClr>
+              <a:buSzPts val="1400"/>
+              <a:buFont typeface="Squada One"/>
+              <a:buNone/>
+              <a:defRPr sz="1400" b="0" i="0" u="none" strike="noStrike" cap="none">
+                <a:solidFill>
+                  <a:schemeClr val="dk1"/>
+                </a:solidFill>
+                <a:latin typeface="Squada One"/>
+                <a:ea typeface="Squada One"/>
+                <a:cs typeface="Squada One"/>
+                <a:sym typeface="Squada One"/>
+              </a:defRPr>
+            </a:lvl5pPr>
+            <a:lvl6pPr marR="0" lvl="5" algn="r" rtl="0">
+              <a:lnSpc>
+                <a:spcPct val="100000"/>
+              </a:lnSpc>
+              <a:spcBef>
+                <a:spcPts val="0"/>
+              </a:spcBef>
+              <a:spcAft>
+                <a:spcPts val="0"/>
+              </a:spcAft>
+              <a:buClr>
+                <a:schemeClr val="dk1"/>
+              </a:buClr>
+              <a:buSzPts val="1400"/>
+              <a:buFont typeface="Squada One"/>
+              <a:buNone/>
+              <a:defRPr sz="1400" b="0" i="0" u="none" strike="noStrike" cap="none">
+                <a:solidFill>
+                  <a:schemeClr val="dk1"/>
+                </a:solidFill>
+                <a:latin typeface="Squada One"/>
+                <a:ea typeface="Squada One"/>
+                <a:cs typeface="Squada One"/>
+                <a:sym typeface="Squada One"/>
+              </a:defRPr>
+            </a:lvl6pPr>
+            <a:lvl7pPr marR="0" lvl="6" algn="r" rtl="0">
+              <a:lnSpc>
+                <a:spcPct val="100000"/>
+              </a:lnSpc>
+              <a:spcBef>
+                <a:spcPts val="0"/>
+              </a:spcBef>
+              <a:spcAft>
+                <a:spcPts val="0"/>
+              </a:spcAft>
+              <a:buClr>
+                <a:schemeClr val="dk1"/>
+              </a:buClr>
+              <a:buSzPts val="1400"/>
+              <a:buFont typeface="Squada One"/>
+              <a:buNone/>
+              <a:defRPr sz="1400" b="0" i="0" u="none" strike="noStrike" cap="none">
+                <a:solidFill>
+                  <a:schemeClr val="dk1"/>
+                </a:solidFill>
+                <a:latin typeface="Squada One"/>
+                <a:ea typeface="Squada One"/>
+                <a:cs typeface="Squada One"/>
+                <a:sym typeface="Squada One"/>
+              </a:defRPr>
+            </a:lvl7pPr>
+            <a:lvl8pPr marR="0" lvl="7" algn="r" rtl="0">
+              <a:lnSpc>
+                <a:spcPct val="100000"/>
+              </a:lnSpc>
+              <a:spcBef>
+                <a:spcPts val="0"/>
+              </a:spcBef>
+              <a:spcAft>
+                <a:spcPts val="0"/>
+              </a:spcAft>
+              <a:buClr>
+                <a:schemeClr val="dk1"/>
+              </a:buClr>
+              <a:buSzPts val="1400"/>
+              <a:buFont typeface="Squada One"/>
+              <a:buNone/>
+              <a:defRPr sz="1400" b="0" i="0" u="none" strike="noStrike" cap="none">
+                <a:solidFill>
+                  <a:schemeClr val="dk1"/>
+                </a:solidFill>
+                <a:latin typeface="Squada One"/>
+                <a:ea typeface="Squada One"/>
+                <a:cs typeface="Squada One"/>
+                <a:sym typeface="Squada One"/>
+              </a:defRPr>
+            </a:lvl8pPr>
+            <a:lvl9pPr marR="0" lvl="8" algn="r" rtl="0">
+              <a:lnSpc>
+                <a:spcPct val="100000"/>
+              </a:lnSpc>
+              <a:spcBef>
+                <a:spcPts val="0"/>
+              </a:spcBef>
+              <a:spcAft>
+                <a:spcPts val="0"/>
+              </a:spcAft>
+              <a:buClr>
+                <a:schemeClr val="dk1"/>
+              </a:buClr>
+              <a:buSzPts val="1400"/>
+              <a:buFont typeface="Squada One"/>
+              <a:buNone/>
+              <a:defRPr sz="1400" b="0" i="0" u="none" strike="noStrike" cap="none">
+                <a:solidFill>
+                  <a:schemeClr val="dk1"/>
+                </a:solidFill>
+                <a:latin typeface="Squada One"/>
+                <a:ea typeface="Squada One"/>
+                <a:cs typeface="Squada One"/>
+                <a:sym typeface="Squada One"/>
+              </a:defRPr>
+            </a:lvl9pPr>
+          </a:lstStyle>
+          <a:p>
+            <a:pPr algn="ctr"/>
+            <a:r>
+              <a:rPr lang="pt-PT" sz="1600" dirty="0"/>
+              <a:t>OBTENDO UM CÓDIGO O MAIS OTIMIZADO E SIMPLES POSSÍVEL</a:t>
+            </a:r>
+          </a:p>
+        </p:txBody>
+      </p:sp>
     </p:spTree>
     <p:extLst>
       <p:ext uri="{BB962C8B-B14F-4D97-AF65-F5344CB8AC3E}">
@@ -18669,7 +19704,7 @@
                             </p:stCondLst>
                             <p:childTnLst>
                               <p:par>
-                                <p:cTn id="5" presetID="10" presetClass="entr" presetSubtype="0" fill="hold" nodeType="clickEffect">
+                                <p:cTn id="5" presetID="1" presetClass="entr" presetSubtype="0" fill="hold" grpId="0" nodeType="clickEffect">
                                   <p:stCondLst>
                                     <p:cond delay="0"/>
                                   </p:stCondLst>
@@ -18692,11 +19727,213 @@
                                         <p:strVal val="visible"/>
                                       </p:to>
                                     </p:set>
+                                  </p:childTnLst>
+                                </p:cTn>
+                              </p:par>
+                              <p:par>
+                                <p:cTn id="7" presetID="10" presetClass="entr" presetSubtype="0" fill="hold" nodeType="withEffect">
+                                  <p:stCondLst>
+                                    <p:cond delay="0"/>
+                                  </p:stCondLst>
+                                  <p:childTnLst>
+                                    <p:set>
+                                      <p:cBhvr>
+                                        <p:cTn id="8" dur="1" fill="hold">
+                                          <p:stCondLst>
+                                            <p:cond delay="0"/>
+                                          </p:stCondLst>
+                                        </p:cTn>
+                                        <p:tgtEl>
+                                          <p:spTgt spid="5"/>
+                                        </p:tgtEl>
+                                        <p:attrNameLst>
+                                          <p:attrName>style.visibility</p:attrName>
+                                        </p:attrNameLst>
+                                      </p:cBhvr>
+                                      <p:to>
+                                        <p:strVal val="visible"/>
+                                      </p:to>
+                                    </p:set>
                                     <p:animEffect transition="in" filter="fade">
                                       <p:cBhvr>
-                                        <p:cTn id="7" dur="1000"/>
+                                        <p:cTn id="9" dur="1000"/>
                                         <p:tgtEl>
-                                          <p:spTgt spid="22"/>
+                                          <p:spTgt spid="5"/>
+                                        </p:tgtEl>
+                                      </p:cBhvr>
+                                    </p:animEffect>
+                                  </p:childTnLst>
+                                </p:cTn>
+                              </p:par>
+                              <p:par>
+                                <p:cTn id="10" presetID="10" presetClass="entr" presetSubtype="0" fill="hold" nodeType="withEffect">
+                                  <p:stCondLst>
+                                    <p:cond delay="0"/>
+                                  </p:stCondLst>
+                                  <p:childTnLst>
+                                    <p:set>
+                                      <p:cBhvr>
+                                        <p:cTn id="11" dur="1" fill="hold">
+                                          <p:stCondLst>
+                                            <p:cond delay="0"/>
+                                          </p:stCondLst>
+                                        </p:cTn>
+                                        <p:tgtEl>
+                                          <p:spTgt spid="6"/>
+                                        </p:tgtEl>
+                                        <p:attrNameLst>
+                                          <p:attrName>style.visibility</p:attrName>
+                                        </p:attrNameLst>
+                                      </p:cBhvr>
+                                      <p:to>
+                                        <p:strVal val="visible"/>
+                                      </p:to>
+                                    </p:set>
+                                    <p:animEffect transition="in" filter="fade">
+                                      <p:cBhvr>
+                                        <p:cTn id="12" dur="1000"/>
+                                        <p:tgtEl>
+                                          <p:spTgt spid="6"/>
+                                        </p:tgtEl>
+                                      </p:cBhvr>
+                                    </p:animEffect>
+                                  </p:childTnLst>
+                                </p:cTn>
+                              </p:par>
+                              <p:par>
+                                <p:cTn id="13" presetID="10" presetClass="entr" presetSubtype="0" fill="hold" nodeType="withEffect">
+                                  <p:stCondLst>
+                                    <p:cond delay="0"/>
+                                  </p:stCondLst>
+                                  <p:childTnLst>
+                                    <p:set>
+                                      <p:cBhvr>
+                                        <p:cTn id="14" dur="1" fill="hold">
+                                          <p:stCondLst>
+                                            <p:cond delay="0"/>
+                                          </p:stCondLst>
+                                        </p:cTn>
+                                        <p:tgtEl>
+                                          <p:spTgt spid="7"/>
+                                        </p:tgtEl>
+                                        <p:attrNameLst>
+                                          <p:attrName>style.visibility</p:attrName>
+                                        </p:attrNameLst>
+                                      </p:cBhvr>
+                                      <p:to>
+                                        <p:strVal val="visible"/>
+                                      </p:to>
+                                    </p:set>
+                                    <p:animEffect transition="in" filter="fade">
+                                      <p:cBhvr>
+                                        <p:cTn id="15" dur="1000"/>
+                                        <p:tgtEl>
+                                          <p:spTgt spid="7"/>
+                                        </p:tgtEl>
+                                      </p:cBhvr>
+                                    </p:animEffect>
+                                  </p:childTnLst>
+                                </p:cTn>
+                              </p:par>
+                              <p:par>
+                                <p:cTn id="16" presetID="10" presetClass="entr" presetSubtype="0" fill="hold" nodeType="withEffect">
+                                  <p:stCondLst>
+                                    <p:cond delay="0"/>
+                                  </p:stCondLst>
+                                  <p:childTnLst>
+                                    <p:set>
+                                      <p:cBhvr>
+                                        <p:cTn id="17" dur="1" fill="hold">
+                                          <p:stCondLst>
+                                            <p:cond delay="0"/>
+                                          </p:stCondLst>
+                                        </p:cTn>
+                                        <p:tgtEl>
+                                          <p:spTgt spid="8"/>
+                                        </p:tgtEl>
+                                        <p:attrNameLst>
+                                          <p:attrName>style.visibility</p:attrName>
+                                        </p:attrNameLst>
+                                      </p:cBhvr>
+                                      <p:to>
+                                        <p:strVal val="visible"/>
+                                      </p:to>
+                                    </p:set>
+                                    <p:animEffect transition="in" filter="fade">
+                                      <p:cBhvr>
+                                        <p:cTn id="18" dur="1000"/>
+                                        <p:tgtEl>
+                                          <p:spTgt spid="8"/>
+                                        </p:tgtEl>
+                                      </p:cBhvr>
+                                    </p:animEffect>
+                                  </p:childTnLst>
+                                </p:cTn>
+                              </p:par>
+                              <p:par>
+                                <p:cTn id="19" presetID="10" presetClass="entr" presetSubtype="0" fill="hold" nodeType="withEffect">
+                                  <p:stCondLst>
+                                    <p:cond delay="0"/>
+                                  </p:stCondLst>
+                                  <p:childTnLst>
+                                    <p:set>
+                                      <p:cBhvr>
+                                        <p:cTn id="20" dur="1" fill="hold">
+                                          <p:stCondLst>
+                                            <p:cond delay="0"/>
+                                          </p:stCondLst>
+                                        </p:cTn>
+                                        <p:tgtEl>
+                                          <p:spTgt spid="9"/>
+                                        </p:tgtEl>
+                                        <p:attrNameLst>
+                                          <p:attrName>style.visibility</p:attrName>
+                                        </p:attrNameLst>
+                                      </p:cBhvr>
+                                      <p:to>
+                                        <p:strVal val="visible"/>
+                                      </p:to>
+                                    </p:set>
+                                    <p:animEffect transition="in" filter="fade">
+                                      <p:cBhvr>
+                                        <p:cTn id="21" dur="1000"/>
+                                        <p:tgtEl>
+                                          <p:spTgt spid="9"/>
+                                        </p:tgtEl>
+                                      </p:cBhvr>
+                                    </p:animEffect>
+                                  </p:childTnLst>
+                                </p:cTn>
+                              </p:par>
+                              <p:par>
+                                <p:cTn id="22" presetID="10" presetClass="entr" presetSubtype="0" fill="hold" nodeType="withEffect">
+                                  <p:stCondLst>
+                                    <p:cond delay="0"/>
+                                  </p:stCondLst>
+                                  <p:childTnLst>
+                                    <p:set>
+                                      <p:cBhvr>
+                                        <p:cTn id="23" dur="1" fill="hold">
+                                          <p:stCondLst>
+                                            <p:cond delay="0"/>
+                                          </p:stCondLst>
+                                        </p:cTn>
+                                        <p:tgtEl>
+                                          <p:spTgt spid="11"/>
+                                        </p:tgtEl>
+                                        <p:attrNameLst>
+                                          <p:attrName>style.visibility</p:attrName>
+                                        </p:attrNameLst>
+                                      </p:cBhvr>
+                                      <p:to>
+                                        <p:strVal val="visible"/>
+                                      </p:to>
+                                    </p:set>
+                                    <p:animEffect transition="in" filter="fade">
+                                      <p:cBhvr>
+                                        <p:cTn id="24" dur="1000"/>
+                                        <p:tgtEl>
+                                          <p:spTgt spid="11"/>
                                         </p:tgtEl>
                                       </p:cBhvr>
                                     </p:animEffect>
@@ -18730,6 +19967,9 @@
         </p:cTn>
       </p:par>
     </p:tnLst>
+    <p:bldLst>
+      <p:bldP spid="22" grpId="0"/>
+    </p:bldLst>
   </p:timing>
 </p:sld>
 </file>
@@ -18828,10 +20068,10 @@
               <a:buNone/>
             </a:pPr>
             <a:r>
-              <a:rPr lang="en"/>
+              <a:rPr lang="en" dirty="0"/>
               <a:t>DEFINIÇÃO DA RESOLUÇÃO TEMPORAL</a:t>
             </a:r>
-            <a:endParaRPr/>
+            <a:endParaRPr dirty="0"/>
           </a:p>
         </p:txBody>
       </p:sp>

</xml_diff>